<commit_message>
Add: presentation file for BaoVeDeCuong
</commit_message>
<xml_diff>
--- a/Documents/BaoCao/SystemDesign.pptx
+++ b/Documents/BaoCao/SystemDesign.pptx
@@ -259,7 +259,7 @@
           <a:p>
             <a:fld id="{867897E1-2F7A-45D8-9804-2520709C300F}" type="datetimeFigureOut">
               <a:rPr lang="en-US" smtClean="0"/>
-              <a:t>08/16/2018</a:t>
+              <a:t>09/13/2018</a:t>
             </a:fld>
             <a:endParaRPr lang="en-US"/>
           </a:p>
@@ -457,7 +457,7 @@
           <a:p>
             <a:fld id="{867897E1-2F7A-45D8-9804-2520709C300F}" type="datetimeFigureOut">
               <a:rPr lang="en-US" smtClean="0"/>
-              <a:t>08/16/2018</a:t>
+              <a:t>09/13/2018</a:t>
             </a:fld>
             <a:endParaRPr lang="en-US"/>
           </a:p>
@@ -665,7 +665,7 @@
           <a:p>
             <a:fld id="{867897E1-2F7A-45D8-9804-2520709C300F}" type="datetimeFigureOut">
               <a:rPr lang="en-US" smtClean="0"/>
-              <a:t>08/16/2018</a:t>
+              <a:t>09/13/2018</a:t>
             </a:fld>
             <a:endParaRPr lang="en-US"/>
           </a:p>
@@ -863,7 +863,7 @@
           <a:p>
             <a:fld id="{867897E1-2F7A-45D8-9804-2520709C300F}" type="datetimeFigureOut">
               <a:rPr lang="en-US" smtClean="0"/>
-              <a:t>08/16/2018</a:t>
+              <a:t>09/13/2018</a:t>
             </a:fld>
             <a:endParaRPr lang="en-US"/>
           </a:p>
@@ -1138,7 +1138,7 @@
           <a:p>
             <a:fld id="{867897E1-2F7A-45D8-9804-2520709C300F}" type="datetimeFigureOut">
               <a:rPr lang="en-US" smtClean="0"/>
-              <a:t>08/16/2018</a:t>
+              <a:t>09/13/2018</a:t>
             </a:fld>
             <a:endParaRPr lang="en-US"/>
           </a:p>
@@ -1403,7 +1403,7 @@
           <a:p>
             <a:fld id="{867897E1-2F7A-45D8-9804-2520709C300F}" type="datetimeFigureOut">
               <a:rPr lang="en-US" smtClean="0"/>
-              <a:t>08/16/2018</a:t>
+              <a:t>09/13/2018</a:t>
             </a:fld>
             <a:endParaRPr lang="en-US"/>
           </a:p>
@@ -1815,7 +1815,7 @@
           <a:p>
             <a:fld id="{867897E1-2F7A-45D8-9804-2520709C300F}" type="datetimeFigureOut">
               <a:rPr lang="en-US" smtClean="0"/>
-              <a:t>08/16/2018</a:t>
+              <a:t>09/13/2018</a:t>
             </a:fld>
             <a:endParaRPr lang="en-US"/>
           </a:p>
@@ -1956,7 +1956,7 @@
           <a:p>
             <a:fld id="{867897E1-2F7A-45D8-9804-2520709C300F}" type="datetimeFigureOut">
               <a:rPr lang="en-US" smtClean="0"/>
-              <a:t>08/16/2018</a:t>
+              <a:t>09/13/2018</a:t>
             </a:fld>
             <a:endParaRPr lang="en-US"/>
           </a:p>
@@ -2069,7 +2069,7 @@
           <a:p>
             <a:fld id="{867897E1-2F7A-45D8-9804-2520709C300F}" type="datetimeFigureOut">
               <a:rPr lang="en-US" smtClean="0"/>
-              <a:t>08/16/2018</a:t>
+              <a:t>09/13/2018</a:t>
             </a:fld>
             <a:endParaRPr lang="en-US"/>
           </a:p>
@@ -2380,7 +2380,7 @@
           <a:p>
             <a:fld id="{867897E1-2F7A-45D8-9804-2520709C300F}" type="datetimeFigureOut">
               <a:rPr lang="en-US" smtClean="0"/>
-              <a:t>08/16/2018</a:t>
+              <a:t>09/13/2018</a:t>
             </a:fld>
             <a:endParaRPr lang="en-US"/>
           </a:p>
@@ -2668,7 +2668,7 @@
           <a:p>
             <a:fld id="{867897E1-2F7A-45D8-9804-2520709C300F}" type="datetimeFigureOut">
               <a:rPr lang="en-US" smtClean="0"/>
-              <a:t>08/16/2018</a:t>
+              <a:t>09/13/2018</a:t>
             </a:fld>
             <a:endParaRPr lang="en-US"/>
           </a:p>
@@ -2909,7 +2909,7 @@
           <a:p>
             <a:fld id="{867897E1-2F7A-45D8-9804-2520709C300F}" type="datetimeFigureOut">
               <a:rPr lang="en-US" smtClean="0"/>
-              <a:t>08/16/2018</a:t>
+              <a:t>09/13/2018</a:t>
             </a:fld>
             <a:endParaRPr lang="en-US"/>
           </a:p>
@@ -3328,10 +3328,10 @@
       </p:grpSpPr>
       <p:grpSp>
         <p:nvGrpSpPr>
-          <p:cNvPr id="13" name="Group 12">
-            <a:extLst>
-              <a:ext uri="{FF2B5EF4-FFF2-40B4-BE49-F238E27FC236}">
-                <a16:creationId xmlns:a16="http://schemas.microsoft.com/office/drawing/2014/main" id="{32140385-D188-4563-A293-A26C4B5AB15C}"/>
+          <p:cNvPr id="15" name="Group 14">
+            <a:extLst>
+              <a:ext uri="{FF2B5EF4-FFF2-40B4-BE49-F238E27FC236}">
+                <a16:creationId xmlns:a16="http://schemas.microsoft.com/office/drawing/2014/main" id="{766CD257-EE4E-469F-BD73-3E62AA38E999}"/>
               </a:ext>
             </a:extLst>
           </p:cNvPr>
@@ -3341,9 +3341,9 @@
         <p:grpSpPr>
           <a:xfrm>
             <a:off x="780400" y="463876"/>
-            <a:ext cx="10735945" cy="5585023"/>
+            <a:ext cx="8066648" cy="5585023"/>
             <a:chOff x="780400" y="463876"/>
-            <a:chExt cx="10735945" cy="5585023"/>
+            <a:chExt cx="8066648" cy="5585023"/>
           </a:xfrm>
         </p:grpSpPr>
         <p:sp>
@@ -3398,106 +3398,6 @@
         </p:sp>
         <p:sp>
           <p:nvSpPr>
-            <p:cNvPr id="5" name="Rectangle: Rounded Corners 4">
-              <a:extLst>
-                <a:ext uri="{FF2B5EF4-FFF2-40B4-BE49-F238E27FC236}">
-                  <a16:creationId xmlns:a16="http://schemas.microsoft.com/office/drawing/2014/main" id="{4D549E02-31AF-4485-91CE-C590CF0F16E5}"/>
-                </a:ext>
-              </a:extLst>
-            </p:cNvPr>
-            <p:cNvSpPr/>
-            <p:nvPr/>
-          </p:nvSpPr>
-          <p:spPr>
-            <a:xfrm>
-              <a:off x="8471366" y="596417"/>
-              <a:ext cx="3044979" cy="1735721"/>
-            </a:xfrm>
-            <a:prstGeom prst="roundRect">
-              <a:avLst/>
-            </a:prstGeom>
-          </p:spPr>
-          <p:style>
-            <a:lnRef idx="1">
-              <a:schemeClr val="accent3"/>
-            </a:lnRef>
-            <a:fillRef idx="2">
-              <a:schemeClr val="accent3"/>
-            </a:fillRef>
-            <a:effectRef idx="1">
-              <a:schemeClr val="accent3"/>
-            </a:effectRef>
-            <a:fontRef idx="minor">
-              <a:schemeClr val="dk1"/>
-            </a:fontRef>
-          </p:style>
-          <p:txBody>
-            <a:bodyPr rtlCol="0" anchor="ctr"/>
-            <a:lstStyle/>
-            <a:p>
-              <a:pPr algn="ctr"/>
-              <a:r>
-                <a:rPr lang="en-US" sz="2800" dirty="0">
-                  <a:latin typeface="Times New Roman" panose="02020603050405020304" pitchFamily="18" charset="0"/>
-                  <a:cs typeface="Times New Roman" panose="02020603050405020304" pitchFamily="18" charset="0"/>
-                </a:rPr>
-                <a:t>Gateway</a:t>
-              </a:r>
-            </a:p>
-          </p:txBody>
-        </p:sp>
-        <p:sp>
-          <p:nvSpPr>
-            <p:cNvPr id="6" name="Rectangle: Rounded Corners 5">
-              <a:extLst>
-                <a:ext uri="{FF2B5EF4-FFF2-40B4-BE49-F238E27FC236}">
-                  <a16:creationId xmlns:a16="http://schemas.microsoft.com/office/drawing/2014/main" id="{994A143A-E191-4E97-BF4C-AB58F711449F}"/>
-                </a:ext>
-              </a:extLst>
-            </p:cNvPr>
-            <p:cNvSpPr/>
-            <p:nvPr/>
-          </p:nvSpPr>
-          <p:spPr>
-            <a:xfrm>
-              <a:off x="8471366" y="4313178"/>
-              <a:ext cx="3044979" cy="1735721"/>
-            </a:xfrm>
-            <a:prstGeom prst="roundRect">
-              <a:avLst/>
-            </a:prstGeom>
-          </p:spPr>
-          <p:style>
-            <a:lnRef idx="1">
-              <a:schemeClr val="accent3"/>
-            </a:lnRef>
-            <a:fillRef idx="2">
-              <a:schemeClr val="accent3"/>
-            </a:fillRef>
-            <a:effectRef idx="1">
-              <a:schemeClr val="accent3"/>
-            </a:effectRef>
-            <a:fontRef idx="minor">
-              <a:schemeClr val="dk1"/>
-            </a:fontRef>
-          </p:style>
-          <p:txBody>
-            <a:bodyPr rtlCol="0" anchor="ctr"/>
-            <a:lstStyle/>
-            <a:p>
-              <a:pPr algn="ctr"/>
-              <a:r>
-                <a:rPr lang="en-US" sz="2800" dirty="0">
-                  <a:latin typeface="Times New Roman" panose="02020603050405020304" pitchFamily="18" charset="0"/>
-                  <a:cs typeface="Times New Roman" panose="02020603050405020304" pitchFamily="18" charset="0"/>
-                </a:rPr>
-                <a:t>Server</a:t>
-              </a:r>
-            </a:p>
-          </p:txBody>
-        </p:sp>
-        <p:sp>
-          <p:nvSpPr>
             <p:cNvPr id="7" name="Rectangle: Rounded Corners 6">
               <a:extLst>
                 <a:ext uri="{FF2B5EF4-FFF2-40B4-BE49-F238E27FC236}">
@@ -3541,7 +3441,7 @@
                   <a:latin typeface="Times New Roman" panose="02020603050405020304" pitchFamily="18" charset="0"/>
                   <a:cs typeface="Times New Roman" panose="02020603050405020304" pitchFamily="18" charset="0"/>
                 </a:rPr>
-                <a:t>User</a:t>
+                <a:t>Web</a:t>
               </a:r>
             </a:p>
           </p:txBody>
@@ -3561,7 +3461,7 @@
           <p:spPr>
             <a:xfrm>
               <a:off x="3956806" y="1086557"/>
-              <a:ext cx="4263043" cy="755440"/>
+              <a:ext cx="1713837" cy="755440"/>
             </a:xfrm>
             <a:prstGeom prst="rightArrow">
               <a:avLst/>
@@ -3608,54 +3508,7 @@
           <p:spPr>
             <a:xfrm rot="10800000">
               <a:off x="3956806" y="4803318"/>
-              <a:ext cx="4263042" cy="755440"/>
-            </a:xfrm>
-            <a:prstGeom prst="rightArrow">
-              <a:avLst/>
-            </a:prstGeom>
-          </p:spPr>
-          <p:style>
-            <a:lnRef idx="1">
-              <a:schemeClr val="accent3"/>
-            </a:lnRef>
-            <a:fillRef idx="2">
-              <a:schemeClr val="accent3"/>
-            </a:fillRef>
-            <a:effectRef idx="1">
-              <a:schemeClr val="accent3"/>
-            </a:effectRef>
-            <a:fontRef idx="minor">
-              <a:schemeClr val="dk1"/>
-            </a:fontRef>
-          </p:style>
-          <p:txBody>
-            <a:bodyPr rtlCol="0" anchor="ctr"/>
-            <a:lstStyle/>
-            <a:p>
-              <a:pPr algn="ctr"/>
-              <a:endParaRPr lang="en-US" sz="2000">
-                <a:latin typeface="Times New Roman" panose="02020603050405020304" pitchFamily="18" charset="0"/>
-                <a:cs typeface="Times New Roman" panose="02020603050405020304" pitchFamily="18" charset="0"/>
-              </a:endParaRPr>
-            </a:p>
-          </p:txBody>
-        </p:sp>
-        <p:sp>
-          <p:nvSpPr>
-            <p:cNvPr id="10" name="Arrow: Right 9">
-              <a:extLst>
-                <a:ext uri="{FF2B5EF4-FFF2-40B4-BE49-F238E27FC236}">
-                  <a16:creationId xmlns:a16="http://schemas.microsoft.com/office/drawing/2014/main" id="{F07A810D-17F5-4A62-8FF5-3E7526CD3921}"/>
-                </a:ext>
-              </a:extLst>
-            </p:cNvPr>
-            <p:cNvSpPr/>
-            <p:nvPr/>
-          </p:nvSpPr>
-          <p:spPr>
-            <a:xfrm rot="5400000">
-              <a:off x="9096232" y="2971852"/>
-              <a:ext cx="1795246" cy="650046"/>
+              <a:ext cx="1713837" cy="755440"/>
             </a:xfrm>
             <a:prstGeom prst="rightArrow">
               <a:avLst/>
@@ -3715,7 +3568,7 @@
           </p:blipFill>
           <p:spPr>
             <a:xfrm>
-              <a:off x="5670643" y="463876"/>
+              <a:off x="4269682" y="463876"/>
               <a:ext cx="835365" cy="835365"/>
             </a:xfrm>
             <a:prstGeom prst="rect">
@@ -3723,89 +3576,221 @@
             </a:prstGeom>
           </p:spPr>
         </p:pic>
-        <p:pic>
-          <p:nvPicPr>
-            <p:cNvPr id="12" name="Picture 11">
+        <p:grpSp>
+          <p:nvGrpSpPr>
+            <p:cNvPr id="14" name="Group 13">
               <a:extLst>
                 <a:ext uri="{FF2B5EF4-FFF2-40B4-BE49-F238E27FC236}">
-                  <a16:creationId xmlns:a16="http://schemas.microsoft.com/office/drawing/2014/main" id="{35B0ECD3-39FF-4AF4-B654-1A772DC4FBD5}"/>
+                  <a16:creationId xmlns:a16="http://schemas.microsoft.com/office/drawing/2014/main" id="{AB1F1D4C-50C5-4DC7-894C-83700B22A9FD}"/>
                 </a:ext>
               </a:extLst>
             </p:cNvPr>
-            <p:cNvPicPr>
-              <a:picLocks noChangeAspect="1"/>
-            </p:cNvPicPr>
+            <p:cNvGrpSpPr/>
             <p:nvPr/>
-          </p:nvPicPr>
-          <p:blipFill>
-            <a:blip r:embed="rId3">
+          </p:nvGrpSpPr>
+          <p:grpSpPr>
+            <a:xfrm>
+              <a:off x="5802069" y="596417"/>
+              <a:ext cx="3044979" cy="5452482"/>
+              <a:chOff x="8471366" y="596417"/>
+              <a:chExt cx="3044979" cy="5452482"/>
+            </a:xfrm>
+          </p:grpSpPr>
+          <p:sp>
+            <p:nvSpPr>
+              <p:cNvPr id="5" name="Rectangle: Rounded Corners 4">
+                <a:extLst>
+                  <a:ext uri="{FF2B5EF4-FFF2-40B4-BE49-F238E27FC236}">
+                    <a16:creationId xmlns:a16="http://schemas.microsoft.com/office/drawing/2014/main" id="{4D549E02-31AF-4485-91CE-C590CF0F16E5}"/>
+                  </a:ext>
+                </a:extLst>
+              </p:cNvPr>
+              <p:cNvSpPr/>
+              <p:nvPr/>
+            </p:nvSpPr>
+            <p:spPr>
+              <a:xfrm>
+                <a:off x="8471366" y="596417"/>
+                <a:ext cx="3044979" cy="1735721"/>
+              </a:xfrm>
+              <a:prstGeom prst="roundRect">
+                <a:avLst/>
+              </a:prstGeom>
+            </p:spPr>
+            <p:style>
+              <a:lnRef idx="1">
+                <a:schemeClr val="accent3"/>
+              </a:lnRef>
+              <a:fillRef idx="2">
+                <a:schemeClr val="accent3"/>
+              </a:fillRef>
+              <a:effectRef idx="1">
+                <a:schemeClr val="accent3"/>
+              </a:effectRef>
+              <a:fontRef idx="minor">
+                <a:schemeClr val="dk1"/>
+              </a:fontRef>
+            </p:style>
+            <p:txBody>
+              <a:bodyPr rtlCol="0" anchor="ctr"/>
+              <a:lstStyle/>
+              <a:p>
+                <a:pPr algn="ctr"/>
+                <a:r>
+                  <a:rPr lang="en-US" sz="2800" dirty="0">
+                    <a:latin typeface="Times New Roman" panose="02020603050405020304" pitchFamily="18" charset="0"/>
+                    <a:cs typeface="Times New Roman" panose="02020603050405020304" pitchFamily="18" charset="0"/>
+                  </a:rPr>
+                  <a:t>Gateway</a:t>
+                </a:r>
+              </a:p>
+            </p:txBody>
+          </p:sp>
+          <p:sp>
+            <p:nvSpPr>
+              <p:cNvPr id="6" name="Rectangle: Rounded Corners 5">
+                <a:extLst>
+                  <a:ext uri="{FF2B5EF4-FFF2-40B4-BE49-F238E27FC236}">
+                    <a16:creationId xmlns:a16="http://schemas.microsoft.com/office/drawing/2014/main" id="{994A143A-E191-4E97-BF4C-AB58F711449F}"/>
+                  </a:ext>
+                </a:extLst>
+              </p:cNvPr>
+              <p:cNvSpPr/>
+              <p:nvPr/>
+            </p:nvSpPr>
+            <p:spPr>
+              <a:xfrm>
+                <a:off x="8471366" y="4313178"/>
+                <a:ext cx="3044979" cy="1735721"/>
+              </a:xfrm>
+              <a:prstGeom prst="roundRect">
+                <a:avLst/>
+              </a:prstGeom>
+            </p:spPr>
+            <p:style>
+              <a:lnRef idx="1">
+                <a:schemeClr val="accent3"/>
+              </a:lnRef>
+              <a:fillRef idx="2">
+                <a:schemeClr val="accent3"/>
+              </a:fillRef>
+              <a:effectRef idx="1">
+                <a:schemeClr val="accent3"/>
+              </a:effectRef>
+              <a:fontRef idx="minor">
+                <a:schemeClr val="dk1"/>
+              </a:fontRef>
+            </p:style>
+            <p:txBody>
+              <a:bodyPr rtlCol="0" anchor="ctr"/>
+              <a:lstStyle/>
+              <a:p>
+                <a:pPr algn="ctr"/>
+                <a:r>
+                  <a:rPr lang="en-US" sz="2800" dirty="0">
+                    <a:latin typeface="Times New Roman" panose="02020603050405020304" pitchFamily="18" charset="0"/>
+                    <a:cs typeface="Times New Roman" panose="02020603050405020304" pitchFamily="18" charset="0"/>
+                  </a:rPr>
+                  <a:t>Server</a:t>
+                </a:r>
+              </a:p>
+            </p:txBody>
+          </p:sp>
+          <p:sp>
+            <p:nvSpPr>
+              <p:cNvPr id="10" name="Arrow: Right 9">
+                <a:extLst>
+                  <a:ext uri="{FF2B5EF4-FFF2-40B4-BE49-F238E27FC236}">
+                    <a16:creationId xmlns:a16="http://schemas.microsoft.com/office/drawing/2014/main" id="{F07A810D-17F5-4A62-8FF5-3E7526CD3921}"/>
+                  </a:ext>
+                </a:extLst>
+              </p:cNvPr>
+              <p:cNvSpPr/>
+              <p:nvPr/>
+            </p:nvSpPr>
+            <p:spPr>
+              <a:xfrm rot="5400000">
+                <a:off x="9096232" y="2971852"/>
+                <a:ext cx="1795246" cy="650046"/>
+              </a:xfrm>
+              <a:prstGeom prst="rightArrow">
+                <a:avLst/>
+              </a:prstGeom>
+            </p:spPr>
+            <p:style>
+              <a:lnRef idx="1">
+                <a:schemeClr val="accent3"/>
+              </a:lnRef>
+              <a:fillRef idx="2">
+                <a:schemeClr val="accent3"/>
+              </a:fillRef>
+              <a:effectRef idx="1">
+                <a:schemeClr val="accent3"/>
+              </a:effectRef>
+              <a:fontRef idx="minor">
+                <a:schemeClr val="dk1"/>
+              </a:fontRef>
+            </p:style>
+            <p:txBody>
+              <a:bodyPr rtlCol="0" anchor="ctr"/>
+              <a:lstStyle/>
+              <a:p>
+                <a:pPr algn="ctr"/>
+                <a:endParaRPr lang="en-US" sz="2000">
+                  <a:latin typeface="Times New Roman" panose="02020603050405020304" pitchFamily="18" charset="0"/>
+                  <a:cs typeface="Times New Roman" panose="02020603050405020304" pitchFamily="18" charset="0"/>
+                </a:endParaRPr>
+              </a:p>
+            </p:txBody>
+          </p:sp>
+          <p:pic>
+            <p:nvPicPr>
+              <p:cNvPr id="1026" name="Picture 2" descr="Image result for wifi">
+                <a:extLst>
+                  <a:ext uri="{FF2B5EF4-FFF2-40B4-BE49-F238E27FC236}">
+                    <a16:creationId xmlns:a16="http://schemas.microsoft.com/office/drawing/2014/main" id="{DCA14A60-8972-4D69-AB26-24E101B5554B}"/>
+                  </a:ext>
+                </a:extLst>
+              </p:cNvPr>
+              <p:cNvPicPr>
+                <a:picLocks noChangeAspect="1" noChangeArrowheads="1"/>
+              </p:cNvPicPr>
+              <p:nvPr/>
+            </p:nvPicPr>
+            <p:blipFill>
+              <a:blip r:embed="rId3">
+                <a:extLst>
+                  <a:ext uri="{28A0092B-C50C-407E-A947-70E740481C1C}">
+                    <a14:useLocalDpi xmlns:a14="http://schemas.microsoft.com/office/drawing/2010/main" val="0"/>
+                  </a:ext>
+                </a:extLst>
+              </a:blip>
+              <a:srcRect/>
+              <a:stretch>
+                <a:fillRect/>
+              </a:stretch>
+            </p:blipFill>
+            <p:spPr bwMode="auto">
+              <a:xfrm>
+                <a:off x="10366443" y="2956216"/>
+                <a:ext cx="1149902" cy="681317"/>
+              </a:xfrm>
+              <a:prstGeom prst="rect">
+                <a:avLst/>
+              </a:prstGeom>
+              <a:noFill/>
               <a:extLst>
-                <a:ext uri="{28A0092B-C50C-407E-A947-70E740481C1C}">
-                  <a14:useLocalDpi xmlns:a14="http://schemas.microsoft.com/office/drawing/2010/main" val="0"/>
+                <a:ext uri="{909E8E84-426E-40DD-AFC4-6F175D3DCCD1}">
+                  <a14:hiddenFill xmlns:a14="http://schemas.microsoft.com/office/drawing/2010/main">
+                    <a:solidFill>
+                      <a:srgbClr val="FFFFFF"/>
+                    </a:solidFill>
+                  </a14:hiddenFill>
                 </a:ext>
               </a:extLst>
-            </a:blip>
-            <a:stretch>
-              <a:fillRect/>
-            </a:stretch>
-          </p:blipFill>
-          <p:spPr>
-            <a:xfrm>
-              <a:off x="5132752" y="1709238"/>
-              <a:ext cx="1926495" cy="622900"/>
-            </a:xfrm>
-            <a:prstGeom prst="rect">
-              <a:avLst/>
-            </a:prstGeom>
-          </p:spPr>
-        </p:pic>
-        <p:pic>
-          <p:nvPicPr>
-            <p:cNvPr id="1026" name="Picture 2" descr="Image result for wifi">
-              <a:extLst>
-                <a:ext uri="{FF2B5EF4-FFF2-40B4-BE49-F238E27FC236}">
-                  <a16:creationId xmlns:a16="http://schemas.microsoft.com/office/drawing/2014/main" id="{DCA14A60-8972-4D69-AB26-24E101B5554B}"/>
-                </a:ext>
-              </a:extLst>
-            </p:cNvPr>
-            <p:cNvPicPr>
-              <a:picLocks noChangeAspect="1" noChangeArrowheads="1"/>
-            </p:cNvPicPr>
-            <p:nvPr/>
-          </p:nvPicPr>
-          <p:blipFill>
-            <a:blip r:embed="rId4">
-              <a:extLst>
-                <a:ext uri="{28A0092B-C50C-407E-A947-70E740481C1C}">
-                  <a14:useLocalDpi xmlns:a14="http://schemas.microsoft.com/office/drawing/2010/main" val="0"/>
-                </a:ext>
-              </a:extLst>
-            </a:blip>
-            <a:srcRect/>
-            <a:stretch>
-              <a:fillRect/>
-            </a:stretch>
-          </p:blipFill>
-          <p:spPr bwMode="auto">
-            <a:xfrm>
-              <a:off x="10366443" y="2956216"/>
-              <a:ext cx="1149902" cy="681317"/>
-            </a:xfrm>
-            <a:prstGeom prst="rect">
-              <a:avLst/>
-            </a:prstGeom>
-            <a:noFill/>
-            <a:extLst>
-              <a:ext uri="{909E8E84-426E-40DD-AFC4-6F175D3DCCD1}">
-                <a14:hiddenFill xmlns:a14="http://schemas.microsoft.com/office/drawing/2010/main">
-                  <a:solidFill>
-                    <a:srgbClr val="FFFFFF"/>
-                  </a:solidFill>
-                </a14:hiddenFill>
-              </a:ext>
-            </a:extLst>
-          </p:spPr>
-        </p:pic>
+            </p:spPr>
+          </p:pic>
+        </p:grpSp>
       </p:grpSp>
     </p:spTree>
     <p:extLst>

</xml_diff>